<commit_message>
add img to powerpoint
</commit_message>
<xml_diff>
--- a/TEST1.pptx
+++ b/TEST1.pptx
@@ -5,7 +5,7 @@
     <p:sldMasterId id="2147483648" r:id="rId1"/>
   </p:sldMasterIdLst>
   <p:notesMasterIdLst>
-    <p:notesMasterId r:id="rId11"/>
+    <p:notesMasterId r:id="rId12"/>
   </p:notesMasterIdLst>
   <p:sldIdLst>
     <p:sldId id="285" r:id="rId2"/>
@@ -15,8 +15,9 @@
     <p:sldId id="287" r:id="rId6"/>
     <p:sldId id="279" r:id="rId7"/>
     <p:sldId id="286" r:id="rId8"/>
-    <p:sldId id="282" r:id="rId9"/>
-    <p:sldId id="262" r:id="rId10"/>
+    <p:sldId id="288" r:id="rId9"/>
+    <p:sldId id="282" r:id="rId10"/>
+    <p:sldId id="262" r:id="rId11"/>
   </p:sldIdLst>
   <p:sldSz cx="9144000" cy="5143500" type="screen16x9"/>
   <p:notesSz cx="5143500" cy="9144000"/>
@@ -216,7 +217,7 @@
           <a:p>
             <a:fld id="{D720503E-7F5E-4ABE-B869-34FDF8855786}" type="datetimeFigureOut">
               <a:rPr lang="en-US" smtClean="0"/>
-              <a:t>4/24/2020</a:t>
+              <a:t>4/26/2020</a:t>
             </a:fld>
             <a:endParaRPr lang="en-US"/>
           </a:p>
@@ -773,7 +774,7 @@
             </a:pPr>
             <a:fld id="{C6A69C64-0A0C-4D60-B614-E96069CBCE63}" type="datetimeFigureOut">
               <a:rPr lang="en-US"/>
-              <a:t>4/24/2020</a:t>
+              <a:t>4/26/2020</a:t>
             </a:fld>
             <a:endParaRPr lang="en-US"/>
           </a:p>
@@ -965,7 +966,7 @@
             </a:pPr>
             <a:fld id="{C6A69C64-0A0C-4D60-B614-E96069CBCE63}" type="datetimeFigureOut">
               <a:rPr lang="en-US"/>
-              <a:t>4/24/2020</a:t>
+              <a:t>4/26/2020</a:t>
             </a:fld>
             <a:endParaRPr lang="en-US"/>
           </a:p>
@@ -1167,7 +1168,7 @@
             </a:pPr>
             <a:fld id="{C6A69C64-0A0C-4D60-B614-E96069CBCE63}" type="datetimeFigureOut">
               <a:rPr lang="en-US"/>
-              <a:t>4/24/2020</a:t>
+              <a:t>4/26/2020</a:t>
             </a:fld>
             <a:endParaRPr lang="en-US"/>
           </a:p>
@@ -1359,7 +1360,7 @@
             </a:pPr>
             <a:fld id="{C6A69C64-0A0C-4D60-B614-E96069CBCE63}" type="datetimeFigureOut">
               <a:rPr lang="en-US"/>
-              <a:t>4/24/2020</a:t>
+              <a:t>4/26/2020</a:t>
             </a:fld>
             <a:endParaRPr lang="en-US"/>
           </a:p>
@@ -1617,7 +1618,7 @@
             </a:pPr>
             <a:fld id="{C6A69C64-0A0C-4D60-B614-E96069CBCE63}" type="datetimeFigureOut">
               <a:rPr lang="en-US"/>
-              <a:t>4/24/2020</a:t>
+              <a:t>4/26/2020</a:t>
             </a:fld>
             <a:endParaRPr lang="en-US"/>
           </a:p>
@@ -1940,7 +1941,7 @@
             </a:pPr>
             <a:fld id="{C6A69C64-0A0C-4D60-B614-E96069CBCE63}" type="datetimeFigureOut">
               <a:rPr lang="en-US"/>
-              <a:t>4/24/2020</a:t>
+              <a:t>4/26/2020</a:t>
             </a:fld>
             <a:endParaRPr lang="en-US"/>
           </a:p>
@@ -2408,7 +2409,7 @@
             </a:pPr>
             <a:fld id="{C6A69C64-0A0C-4D60-B614-E96069CBCE63}" type="datetimeFigureOut">
               <a:rPr lang="en-US"/>
-              <a:t>4/24/2020</a:t>
+              <a:t>4/26/2020</a:t>
             </a:fld>
             <a:endParaRPr lang="en-US"/>
           </a:p>
@@ -2535,7 +2536,7 @@
             </a:pPr>
             <a:fld id="{C6A69C64-0A0C-4D60-B614-E96069CBCE63}" type="datetimeFigureOut">
               <a:rPr lang="en-US"/>
-              <a:t>4/24/2020</a:t>
+              <a:t>4/26/2020</a:t>
             </a:fld>
             <a:endParaRPr lang="en-US"/>
           </a:p>
@@ -2637,7 +2638,7 @@
             </a:pPr>
             <a:fld id="{C6A69C64-0A0C-4D60-B614-E96069CBCE63}" type="datetimeFigureOut">
               <a:rPr lang="en-US"/>
-              <a:t>4/24/2020</a:t>
+              <a:t>4/26/2020</a:t>
             </a:fld>
             <a:endParaRPr lang="en-US"/>
           </a:p>
@@ -2939,7 +2940,7 @@
             </a:pPr>
             <a:fld id="{C6A69C64-0A0C-4D60-B614-E96069CBCE63}" type="datetimeFigureOut">
               <a:rPr lang="en-US"/>
-              <a:t>4/24/2020</a:t>
+              <a:t>4/26/2020</a:t>
             </a:fld>
             <a:endParaRPr lang="en-US"/>
           </a:p>
@@ -3207,7 +3208,7 @@
             </a:pPr>
             <a:fld id="{C6A69C64-0A0C-4D60-B614-E96069CBCE63}" type="datetimeFigureOut">
               <a:rPr lang="en-US"/>
-              <a:t>4/24/2020</a:t>
+              <a:t>4/26/2020</a:t>
             </a:fld>
             <a:endParaRPr lang="en-US"/>
           </a:p>
@@ -3448,7 +3449,7 @@
             </a:pPr>
             <a:fld id="{C6A69C64-0A0C-4D60-B614-E96069CBCE63}" type="datetimeFigureOut">
               <a:rPr lang="en-US"/>
-              <a:t>4/24/2020</a:t>
+              <a:t>4/26/2020</a:t>
             </a:fld>
             <a:endParaRPr lang="en-US"/>
           </a:p>
@@ -4536,6 +4537,71 @@
 </p:sld>
 </file>
 
+<file path=ppt/slides/slide10.xml><?xml version="1.0" encoding="utf-8"?>
+<p:sld xmlns:a="http://schemas.openxmlformats.org/drawingml/2006/main" xmlns:r="http://schemas.openxmlformats.org/officeDocument/2006/relationships" xmlns:p="http://schemas.openxmlformats.org/presentationml/2006/main">
+  <p:cSld>
+    <p:spTree>
+      <p:nvGrpSpPr>
+        <p:cNvPr id="1" name=""/>
+        <p:cNvGrpSpPr/>
+        <p:nvPr/>
+      </p:nvGrpSpPr>
+      <p:grpSpPr>
+        <a:xfrm>
+          <a:off x="0" y="0"/>
+          <a:ext cx="0" cy="0"/>
+          <a:chOff x="0" y="0"/>
+          <a:chExt cx="0" cy="0"/>
+        </a:xfrm>
+      </p:grpSpPr>
+      <p:sp>
+        <p:nvSpPr>
+          <p:cNvPr id="2" name="Title 1"/>
+          <p:cNvSpPr>
+            <a:spLocks noGrp="1"/>
+          </p:cNvSpPr>
+          <p:nvPr>
+            <p:ph type="ctrTitle"/>
+          </p:nvPr>
+        </p:nvSpPr>
+        <p:spPr>
+          <a:xfrm>
+            <a:off x="611560" y="1707654"/>
+            <a:ext cx="7772400" cy="1125457"/>
+          </a:xfrm>
+        </p:spPr>
+        <p:txBody>
+          <a:bodyPr/>
+          <a:lstStyle/>
+          <a:p>
+            <a:pPr algn="ctr"/>
+            <a:r>
+              <a:rPr lang="vi-VN" spc="300" dirty="0"/>
+              <a:t> </a:t>
+            </a:r>
+            <a:r>
+              <a:rPr lang="en-US" spc="300" dirty="0"/>
+              <a:t>KHÓ KHĂN</a:t>
+            </a:r>
+          </a:p>
+        </p:txBody>
+      </p:sp>
+    </p:spTree>
+    <p:extLst>
+      <p:ext uri="{BB962C8B-B14F-4D97-AF65-F5344CB8AC3E}">
+        <p14:creationId xmlns:p14="http://schemas.microsoft.com/office/powerpoint/2010/main" val="303958223"/>
+      </p:ext>
+    </p:extLst>
+  </p:cSld>
+  <p:clrMapOvr>
+    <a:masterClrMapping/>
+  </p:clrMapOvr>
+  <p:transition spd="slow">
+    <p:push dir="u"/>
+  </p:transition>
+</p:sld>
+</file>
+
 <file path=ppt/slides/slide2.xml><?xml version="1.0" encoding="utf-8"?>
 <p:sld xmlns:a="http://schemas.openxmlformats.org/drawingml/2006/main" xmlns:r="http://schemas.openxmlformats.org/officeDocument/2006/relationships" xmlns:p="http://schemas.openxmlformats.org/presentationml/2006/main" showMasterPhAnim="0">
   <p:cSld>
@@ -7463,6 +7529,69 @@
 </file>
 
 <file path=ppt/slides/slide8.xml><?xml version="1.0" encoding="utf-8"?>
+<p:sld xmlns:a="http://schemas.openxmlformats.org/drawingml/2006/main" xmlns:r="http://schemas.openxmlformats.org/officeDocument/2006/relationships" xmlns:p="http://schemas.openxmlformats.org/presentationml/2006/main">
+  <p:cSld>
+    <p:spTree>
+      <p:nvGrpSpPr>
+        <p:cNvPr id="1" name=""/>
+        <p:cNvGrpSpPr/>
+        <p:nvPr/>
+      </p:nvGrpSpPr>
+      <p:grpSpPr>
+        <a:xfrm>
+          <a:off x="0" y="0"/>
+          <a:ext cx="0" cy="0"/>
+          <a:chOff x="0" y="0"/>
+          <a:chExt cx="0" cy="0"/>
+        </a:xfrm>
+      </p:grpSpPr>
+      <p:pic>
+        <p:nvPicPr>
+          <p:cNvPr id="2" name="Picture 1">
+            <a:extLst>
+              <a:ext uri="{FF2B5EF4-FFF2-40B4-BE49-F238E27FC236}">
+                <a16:creationId xmlns:a16="http://schemas.microsoft.com/office/drawing/2014/main" id="{31F77612-419C-4C3D-85FD-8C7A0A353FE8}"/>
+              </a:ext>
+            </a:extLst>
+          </p:cNvPr>
+          <p:cNvPicPr>
+            <a:picLocks noChangeAspect="1"/>
+          </p:cNvPicPr>
+          <p:nvPr/>
+        </p:nvPicPr>
+        <p:blipFill>
+          <a:blip r:embed="rId2"/>
+          <a:stretch>
+            <a:fillRect/>
+          </a:stretch>
+        </p:blipFill>
+        <p:spPr>
+          <a:xfrm>
+            <a:off x="0" y="0"/>
+            <a:ext cx="9144000" cy="5143500"/>
+          </a:xfrm>
+          <a:prstGeom prst="rect">
+            <a:avLst/>
+          </a:prstGeom>
+        </p:spPr>
+      </p:pic>
+    </p:spTree>
+    <p:extLst>
+      <p:ext uri="{BB962C8B-B14F-4D97-AF65-F5344CB8AC3E}">
+        <p14:creationId xmlns:p14="http://schemas.microsoft.com/office/powerpoint/2010/main" val="4171454989"/>
+      </p:ext>
+    </p:extLst>
+  </p:cSld>
+  <p:clrMapOvr>
+    <a:masterClrMapping/>
+  </p:clrMapOvr>
+  <p:transition spd="slow">
+    <p:push dir="u"/>
+  </p:transition>
+</p:sld>
+</file>
+
+<file path=ppt/slides/slide9.xml><?xml version="1.0" encoding="utf-8"?>
 <p:sld xmlns:a="http://schemas.openxmlformats.org/drawingml/2006/main" xmlns:r="http://schemas.openxmlformats.org/officeDocument/2006/relationships" xmlns:p="http://schemas.openxmlformats.org/presentationml/2006/main">
   <p:cSld>
     <p:spTree>
@@ -8012,71 +8141,6 @@
     <p:extLst>
       <p:ext uri="{BB962C8B-B14F-4D97-AF65-F5344CB8AC3E}">
         <p14:creationId xmlns:p14="http://schemas.microsoft.com/office/powerpoint/2010/main" val="2984443351"/>
-      </p:ext>
-    </p:extLst>
-  </p:cSld>
-  <p:clrMapOvr>
-    <a:masterClrMapping/>
-  </p:clrMapOvr>
-  <p:transition spd="slow">
-    <p:push dir="u"/>
-  </p:transition>
-</p:sld>
-</file>
-
-<file path=ppt/slides/slide9.xml><?xml version="1.0" encoding="utf-8"?>
-<p:sld xmlns:a="http://schemas.openxmlformats.org/drawingml/2006/main" xmlns:r="http://schemas.openxmlformats.org/officeDocument/2006/relationships" xmlns:p="http://schemas.openxmlformats.org/presentationml/2006/main">
-  <p:cSld>
-    <p:spTree>
-      <p:nvGrpSpPr>
-        <p:cNvPr id="1" name=""/>
-        <p:cNvGrpSpPr/>
-        <p:nvPr/>
-      </p:nvGrpSpPr>
-      <p:grpSpPr>
-        <a:xfrm>
-          <a:off x="0" y="0"/>
-          <a:ext cx="0" cy="0"/>
-          <a:chOff x="0" y="0"/>
-          <a:chExt cx="0" cy="0"/>
-        </a:xfrm>
-      </p:grpSpPr>
-      <p:sp>
-        <p:nvSpPr>
-          <p:cNvPr id="2" name="Title 1"/>
-          <p:cNvSpPr>
-            <a:spLocks noGrp="1"/>
-          </p:cNvSpPr>
-          <p:nvPr>
-            <p:ph type="ctrTitle"/>
-          </p:nvPr>
-        </p:nvSpPr>
-        <p:spPr>
-          <a:xfrm>
-            <a:off x="611560" y="1707654"/>
-            <a:ext cx="7772400" cy="1125457"/>
-          </a:xfrm>
-        </p:spPr>
-        <p:txBody>
-          <a:bodyPr/>
-          <a:lstStyle/>
-          <a:p>
-            <a:pPr algn="ctr"/>
-            <a:r>
-              <a:rPr lang="vi-VN" spc="300" dirty="0"/>
-              <a:t> </a:t>
-            </a:r>
-            <a:r>
-              <a:rPr lang="en-US" spc="300" dirty="0"/>
-              <a:t>KHÓ KHĂN</a:t>
-            </a:r>
-          </a:p>
-        </p:txBody>
-      </p:sp>
-    </p:spTree>
-    <p:extLst>
-      <p:ext uri="{BB962C8B-B14F-4D97-AF65-F5344CB8AC3E}">
-        <p14:creationId xmlns:p14="http://schemas.microsoft.com/office/powerpoint/2010/main" val="303958223"/>
       </p:ext>
     </p:extLst>
   </p:cSld>

</xml_diff>